<commit_message>
Lesson 2.4.1 and 1.3.5
</commit_message>
<xml_diff>
--- a/Liberty University/7th Grade/Language Arts/1.3.5 - Presentation/1.3.5 - Presentation.pptx
+++ b/Liberty University/7th Grade/Language Arts/1.3.5 - Presentation/1.3.5 - Presentation.pptx
@@ -333,7 +333,7 @@
               <a:pPr>
                 <a:defRPr/>
               </a:pPr>
-              <a:t>9/25/14</a:t>
+              <a:t>9/29/14</a:t>
             </a:fld>
             <a:endParaRPr lang="fr-CA"/>
           </a:p>
@@ -525,7 +525,7 @@
               <a:pPr>
                 <a:defRPr/>
               </a:pPr>
-              <a:t>9/25/14</a:t>
+              <a:t>9/29/14</a:t>
             </a:fld>
             <a:endParaRPr lang="fr-CA"/>
           </a:p>
@@ -727,7 +727,7 @@
               <a:pPr>
                 <a:defRPr/>
               </a:pPr>
-              <a:t>9/25/14</a:t>
+              <a:t>9/29/14</a:t>
             </a:fld>
             <a:endParaRPr lang="fr-CA"/>
           </a:p>
@@ -919,7 +919,7 @@
               <a:pPr>
                 <a:defRPr/>
               </a:pPr>
-              <a:t>9/25/14</a:t>
+              <a:t>9/29/14</a:t>
             </a:fld>
             <a:endParaRPr lang="fr-CA"/>
           </a:p>
@@ -1187,7 +1187,7 @@
               <a:pPr>
                 <a:defRPr/>
               </a:pPr>
-              <a:t>9/25/14</a:t>
+              <a:t>9/29/14</a:t>
             </a:fld>
             <a:endParaRPr lang="fr-CA"/>
           </a:p>
@@ -1497,7 +1497,7 @@
               <a:pPr>
                 <a:defRPr/>
               </a:pPr>
-              <a:t>9/25/14</a:t>
+              <a:t>9/29/14</a:t>
             </a:fld>
             <a:endParaRPr lang="fr-CA"/>
           </a:p>
@@ -1941,7 +1941,7 @@
               <a:pPr>
                 <a:defRPr/>
               </a:pPr>
-              <a:t>9/25/14</a:t>
+              <a:t>9/29/14</a:t>
             </a:fld>
             <a:endParaRPr lang="fr-CA"/>
           </a:p>
@@ -2081,7 +2081,7 @@
               <a:pPr>
                 <a:defRPr/>
               </a:pPr>
-              <a:t>9/25/14</a:t>
+              <a:t>9/29/14</a:t>
             </a:fld>
             <a:endParaRPr lang="fr-CA"/>
           </a:p>
@@ -2198,7 +2198,7 @@
               <a:pPr>
                 <a:defRPr/>
               </a:pPr>
-              <a:t>9/25/14</a:t>
+              <a:t>9/29/14</a:t>
             </a:fld>
             <a:endParaRPr lang="fr-CA"/>
           </a:p>
@@ -2497,7 +2497,7 @@
               <a:pPr>
                 <a:defRPr/>
               </a:pPr>
-              <a:t>9/25/14</a:t>
+              <a:t>9/29/14</a:t>
             </a:fld>
             <a:endParaRPr lang="fr-CA"/>
           </a:p>
@@ -2779,7 +2779,7 @@
               <a:pPr>
                 <a:defRPr/>
               </a:pPr>
-              <a:t>9/25/14</a:t>
+              <a:t>9/29/14</a:t>
             </a:fld>
             <a:endParaRPr lang="fr-CA"/>
           </a:p>
@@ -3036,7 +3036,7 @@
               <a:pPr>
                 <a:defRPr/>
               </a:pPr>
-              <a:t>9/25/14</a:t>
+              <a:t>9/29/14</a:t>
             </a:fld>
             <a:endParaRPr lang="fr-CA"/>
           </a:p>
@@ -3726,7 +3726,6 @@
               <a:rPr lang="fr-CA" dirty="0" smtClean="0"/>
               <a:t>Introduction</a:t>
             </a:r>
-            <a:endParaRPr lang="fr-CA" dirty="0" smtClean="0"/>
           </a:p>
         </p:txBody>
       </p:sp>
@@ -3759,7 +3758,72 @@
             </a:r>
             <a:r>
               <a:rPr lang="en-US" sz="2000" dirty="0"/>
-              <a:t>believe that baseball is a great sport. Baseball is a game that you play with two teams of 9 players each. These players occupy the nine positions on the field. There are two sets of players on the field the infield and the outfield. The outfield plays the farthest distance from the batters box and the infield plays the closest. The objective of the game is to score as many runs as you can. Runs are scored when a batter hits the ball. If there are runners occupying bases and they make it back to home plate they score a run. If the batter hits the ball over the fence which is called a home run all runners including the batter score. You get one run per runner crossing home plate. The team with the most runs at the end of the game wins.</a:t>
+              <a:t>believe that baseball is a great sport. </a:t>
+            </a:r>
+            <a:endParaRPr lang="en-US" sz="2000" dirty="0" smtClean="0"/>
+          </a:p>
+          <a:p>
+            <a:pPr marL="0" indent="0" algn="just">
+              <a:buNone/>
+            </a:pPr>
+            <a:endParaRPr lang="en-US" sz="2000" dirty="0" smtClean="0"/>
+          </a:p>
+          <a:p>
+            <a:pPr algn="just"/>
+            <a:r>
+              <a:rPr lang="en-US" sz="2000" dirty="0" smtClean="0"/>
+              <a:t>Baseball </a:t>
+            </a:r>
+            <a:r>
+              <a:rPr lang="en-US" sz="2000" dirty="0"/>
+              <a:t>is a game that you play with two teams of 9 players each. </a:t>
+            </a:r>
+            <a:endParaRPr lang="en-US" sz="2000" dirty="0" smtClean="0"/>
+          </a:p>
+          <a:p>
+            <a:pPr algn="just"/>
+            <a:r>
+              <a:rPr lang="en-US" sz="2000" dirty="0" smtClean="0"/>
+              <a:t>The </a:t>
+            </a:r>
+            <a:r>
+              <a:rPr lang="en-US" sz="2000" dirty="0"/>
+              <a:t>objective of the game is to score as many runs as you can. </a:t>
+            </a:r>
+            <a:endParaRPr lang="en-US" sz="2000" dirty="0" smtClean="0"/>
+          </a:p>
+          <a:p>
+            <a:pPr algn="just"/>
+            <a:r>
+              <a:rPr lang="en-US" sz="2000" dirty="0" smtClean="0"/>
+              <a:t>Runners </a:t>
+            </a:r>
+            <a:r>
+              <a:rPr lang="en-US" sz="2000" dirty="0"/>
+              <a:t>occupying bases </a:t>
+            </a:r>
+            <a:r>
+              <a:rPr lang="en-US" sz="2000" dirty="0" smtClean="0"/>
+              <a:t>score when </a:t>
+            </a:r>
+            <a:r>
+              <a:rPr lang="en-US" sz="2000" dirty="0"/>
+              <a:t>they make it back to home </a:t>
+            </a:r>
+            <a:r>
+              <a:rPr lang="en-US" sz="2000" dirty="0" smtClean="0"/>
+              <a:t>plate. </a:t>
+            </a:r>
+          </a:p>
+          <a:p>
+            <a:pPr algn="just"/>
+            <a:r>
+              <a:rPr lang="en-US" sz="2000" dirty="0" smtClean="0"/>
+              <a:t>The </a:t>
+            </a:r>
+            <a:r>
+              <a:rPr lang="en-US" sz="2000" dirty="0"/>
+              <a:t>team with the most runs at the end of the game wins.</a:t>
             </a:r>
           </a:p>
           <a:p>
@@ -3770,6 +3834,36 @@
           </a:p>
         </p:txBody>
       </p:sp>
+      <p:pic>
+        <p:nvPicPr>
+          <p:cNvPr id="2" name="Picture 1" descr="Baseball Intro.png"/>
+          <p:cNvPicPr>
+            <a:picLocks noChangeAspect="1"/>
+          </p:cNvPicPr>
+          <p:nvPr/>
+        </p:nvPicPr>
+        <p:blipFill>
+          <a:blip r:embed="rId3">
+            <a:extLst>
+              <a:ext uri="{28A0092B-C50C-407E-A947-70E740481C1C}">
+                <a14:useLocalDpi xmlns:a14="http://schemas.microsoft.com/office/drawing/2010/main" val="0"/>
+              </a:ext>
+            </a:extLst>
+          </a:blip>
+          <a:stretch>
+            <a:fillRect/>
+          </a:stretch>
+        </p:blipFill>
+        <p:spPr>
+          <a:xfrm>
+            <a:off x="2555776" y="4941168"/>
+            <a:ext cx="4597400" cy="1765300"/>
+          </a:xfrm>
+          <a:prstGeom prst="rect">
+            <a:avLst/>
+          </a:prstGeom>
+        </p:spPr>
+      </p:pic>
     </p:spTree>
   </p:cSld>
   <p:clrMapOvr>
@@ -3836,30 +3930,84 @@
           <a:bodyPr/>
           <a:lstStyle/>
           <a:p>
-            <a:pPr marL="0" indent="0" algn="just">
-              <a:buNone/>
-            </a:pPr>
+            <a:pPr algn="just"/>
             <a:r>
               <a:rPr lang="en-US" sz="2000" dirty="0"/>
-              <a:t>Baseball is a grand game. Its enjoyable because its fun to play. You can have a great time playing different positions. Baseball is entertaining to play with friends and family. Baseball can be also amusing when you change the rules of the game. </a:t>
-            </a:r>
-            <a:r>
-              <a:rPr lang="en-US" sz="2000" u="sng" dirty="0"/>
-              <a:t>On any given weekend during the baseball season thousands of families enjoy the game of baseball.</a:t>
+              <a:t>Baseball is a grand game. </a:t>
+            </a:r>
+            <a:endParaRPr lang="en-US" sz="2000" dirty="0" smtClean="0"/>
+          </a:p>
+          <a:p>
+            <a:pPr algn="just"/>
+            <a:r>
+              <a:rPr lang="en-US" sz="2000" dirty="0" smtClean="0"/>
+              <a:t>You </a:t>
             </a:r>
             <a:r>
               <a:rPr lang="en-US" sz="2000" dirty="0"/>
-              <a:t> There are many different leagues with different rules such as Little League, Babe Ruth Baseball, Recreational Ball, and Travel Ball.</a:t>
-            </a:r>
-          </a:p>
-          <a:p>
-            <a:pPr marL="0" indent="0" algn="just">
-              <a:buNone/>
-            </a:pPr>
+              <a:t>can have a great time playing different positions. </a:t>
+            </a:r>
+            <a:endParaRPr lang="en-US" sz="2000" dirty="0" smtClean="0"/>
+          </a:p>
+          <a:p>
+            <a:pPr algn="just"/>
+            <a:r>
+              <a:rPr lang="en-US" sz="2000" dirty="0" smtClean="0"/>
+              <a:t>Baseball </a:t>
+            </a:r>
+            <a:r>
+              <a:rPr lang="en-US" sz="2000" dirty="0"/>
+              <a:t>can be also amusing when you change the rules of the game. </a:t>
+            </a:r>
+            <a:endParaRPr lang="en-US" sz="2000" dirty="0" smtClean="0"/>
+          </a:p>
+          <a:p>
+            <a:pPr algn="just"/>
+            <a:r>
+              <a:rPr lang="en-US" sz="2000" dirty="0" smtClean="0"/>
+              <a:t>There </a:t>
+            </a:r>
+            <a:r>
+              <a:rPr lang="en-US" sz="2000" dirty="0"/>
+              <a:t>are many different leagues with different rules such as Little League, Babe Ruth Baseball, Recreational Ball, and Travel Ball.</a:t>
+            </a:r>
+          </a:p>
+          <a:p>
+            <a:pPr algn="just"/>
             <a:endParaRPr lang="fr-CA" sz="2000" dirty="0" smtClean="0"/>
           </a:p>
         </p:txBody>
       </p:sp>
+      <p:pic>
+        <p:nvPicPr>
+          <p:cNvPr id="2" name="Picture 1" descr="Kid Fielding.png"/>
+          <p:cNvPicPr>
+            <a:picLocks noChangeAspect="1"/>
+          </p:cNvPicPr>
+          <p:nvPr/>
+        </p:nvPicPr>
+        <p:blipFill>
+          <a:blip r:embed="rId3">
+            <a:extLst>
+              <a:ext uri="{28A0092B-C50C-407E-A947-70E740481C1C}">
+                <a14:useLocalDpi xmlns:a14="http://schemas.microsoft.com/office/drawing/2010/main" val="0"/>
+              </a:ext>
+            </a:extLst>
+          </a:blip>
+          <a:stretch>
+            <a:fillRect/>
+          </a:stretch>
+        </p:blipFill>
+        <p:spPr>
+          <a:xfrm>
+            <a:off x="4211960" y="3797410"/>
+            <a:ext cx="4131816" cy="2914641"/>
+          </a:xfrm>
+          <a:prstGeom prst="rect">
+            <a:avLst/>
+          </a:prstGeom>
+        </p:spPr>
+      </p:pic>
     </p:spTree>
     <p:extLst>
       <p:ext uri="{BB962C8B-B14F-4D97-AF65-F5344CB8AC3E}">
@@ -3931,20 +4079,35 @@
           <a:bodyPr/>
           <a:lstStyle/>
           <a:p>
-            <a:pPr marL="0" indent="0">
-              <a:buNone/>
-            </a:pPr>
+            <a:r>
+              <a:rPr lang="en-US" sz="2000" dirty="0" smtClean="0"/>
+              <a:t>Baseball </a:t>
+            </a:r>
             <a:r>
               <a:rPr lang="en-US" sz="2000" dirty="0"/>
-              <a:t>Additionally, Baseball is great to play at any age. Baseball is easy to play for all ages. Different age groups of play make baseball enjoyable at any age. </a:t>
-            </a:r>
-            <a:r>
-              <a:rPr lang="en-US" sz="2000" u="sng" dirty="0"/>
-              <a:t>Remaining more active in physical activities such as baseball can lead to a longer, healthier, and happier life.</a:t>
+              <a:t>is great to play at any age. </a:t>
+            </a:r>
+            <a:endParaRPr lang="en-US" sz="2000" dirty="0" smtClean="0"/>
+          </a:p>
+          <a:p>
+            <a:r>
+              <a:rPr lang="en-US" sz="2000" dirty="0" smtClean="0"/>
+              <a:t>Remaining </a:t>
             </a:r>
             <a:r>
               <a:rPr lang="en-US" sz="2000" dirty="0"/>
-              <a:t> There are many different age groups such as 4-6, 7-9, 10-12, 13-16, and 50+. Baseball can be taught at any age.</a:t>
+              <a:t>more active in physical activities such as baseball can lead to a longer, healthier, and happier life. </a:t>
+            </a:r>
+            <a:endParaRPr lang="en-US" sz="2000" dirty="0" smtClean="0"/>
+          </a:p>
+          <a:p>
+            <a:r>
+              <a:rPr lang="en-US" sz="2000" dirty="0" smtClean="0"/>
+              <a:t>There </a:t>
+            </a:r>
+            <a:r>
+              <a:rPr lang="en-US" sz="2000" dirty="0"/>
+              <a:t>are many different age groups such as 4-6, 7-9, 10-12, 13-16, and 50+. Baseball can be taught at any age.</a:t>
             </a:r>
           </a:p>
           <a:p>
@@ -3955,6 +4118,66 @@
           </a:p>
         </p:txBody>
       </p:sp>
+      <p:pic>
+        <p:nvPicPr>
+          <p:cNvPr id="2" name="Picture 1" descr="Trololololol.png"/>
+          <p:cNvPicPr>
+            <a:picLocks noChangeAspect="1"/>
+          </p:cNvPicPr>
+          <p:nvPr/>
+        </p:nvPicPr>
+        <p:blipFill>
+          <a:blip r:embed="rId3">
+            <a:extLst>
+              <a:ext uri="{28A0092B-C50C-407E-A947-70E740481C1C}">
+                <a14:useLocalDpi xmlns:a14="http://schemas.microsoft.com/office/drawing/2010/main" val="0"/>
+              </a:ext>
+            </a:extLst>
+          </a:blip>
+          <a:stretch>
+            <a:fillRect/>
+          </a:stretch>
+        </p:blipFill>
+        <p:spPr>
+          <a:xfrm>
+            <a:off x="2195736" y="3429000"/>
+            <a:ext cx="3613786" cy="2258616"/>
+          </a:xfrm>
+          <a:prstGeom prst="rect">
+            <a:avLst/>
+          </a:prstGeom>
+        </p:spPr>
+      </p:pic>
+      <p:pic>
+        <p:nvPicPr>
+          <p:cNvPr id="3" name="Picture 2" descr="2012 LLWS.png"/>
+          <p:cNvPicPr>
+            <a:picLocks noChangeAspect="1"/>
+          </p:cNvPicPr>
+          <p:nvPr/>
+        </p:nvPicPr>
+        <p:blipFill>
+          <a:blip r:embed="rId4">
+            <a:extLst>
+              <a:ext uri="{28A0092B-C50C-407E-A947-70E740481C1C}">
+                <a14:useLocalDpi xmlns:a14="http://schemas.microsoft.com/office/drawing/2010/main" val="0"/>
+              </a:ext>
+            </a:extLst>
+          </a:blip>
+          <a:stretch>
+            <a:fillRect/>
+          </a:stretch>
+        </p:blipFill>
+        <p:spPr>
+          <a:xfrm>
+            <a:off x="5292080" y="4221088"/>
+            <a:ext cx="3384376" cy="2256251"/>
+          </a:xfrm>
+          <a:prstGeom prst="rect">
+            <a:avLst/>
+          </a:prstGeom>
+        </p:spPr>
+      </p:pic>
     </p:spTree>
     <p:extLst>
       <p:ext uri="{BB962C8B-B14F-4D97-AF65-F5344CB8AC3E}">
@@ -4026,21 +4249,48 @@
           <a:bodyPr/>
           <a:lstStyle/>
           <a:p>
-            <a:pPr marL="0" indent="0">
-              <a:buNone/>
-            </a:pPr>
+            <a:r>
+              <a:rPr lang="en-US" sz="2000" dirty="0" smtClean="0"/>
+              <a:t>Baseball </a:t>
+            </a:r>
             <a:r>
               <a:rPr lang="en-US" sz="2000" dirty="0"/>
-              <a:t>On the other hand, Baseball is great for your mind and body. </a:t>
-            </a:r>
-            <a:r>
-              <a:rPr lang="en-US" sz="2000" u="sng" dirty="0"/>
-              <a:t>My coaches who are former major league players say that baseball helped improved their overall mind and body performance.</a:t>
+              <a:t>is great for your mind and body. </a:t>
+            </a:r>
+            <a:endParaRPr lang="en-US" sz="2000" dirty="0" smtClean="0"/>
+          </a:p>
+          <a:p>
+            <a:r>
+              <a:rPr lang="en-US" sz="2000" dirty="0" smtClean="0"/>
+              <a:t>Baseball </a:t>
             </a:r>
             <a:r>
               <a:rPr lang="en-US" sz="2000" dirty="0"/>
-              <a:t> Baseball is good for you because it can be a very active game. Baseball situations help keep your mind and body sharp and fit. Baseball mechanics for pitching, fielding, and throwing keep your body in great shape. In many situations your mind is the key to success.</a:t>
-            </a:r>
+              <a:t>is good for you because it can be a very active game. </a:t>
+            </a:r>
+            <a:endParaRPr lang="en-US" sz="2000" dirty="0" smtClean="0"/>
+          </a:p>
+          <a:p>
+            <a:r>
+              <a:rPr lang="en-US" sz="2000" dirty="0" smtClean="0"/>
+              <a:t>Baseball </a:t>
+            </a:r>
+            <a:r>
+              <a:rPr lang="en-US" sz="2000" dirty="0"/>
+              <a:t>situations help keep your mind and body sharp and fit. </a:t>
+            </a:r>
+            <a:endParaRPr lang="en-US" sz="2000" dirty="0" smtClean="0"/>
+          </a:p>
+          <a:p>
+            <a:r>
+              <a:rPr lang="en-US" sz="2000" dirty="0" smtClean="0"/>
+              <a:t>Baseball </a:t>
+            </a:r>
+            <a:r>
+              <a:rPr lang="en-US" sz="2000" dirty="0"/>
+              <a:t>mechanics for pitching, fielding, and throwing keep your body in great shape. </a:t>
+            </a:r>
+            <a:endParaRPr lang="en-US" sz="2000" dirty="0" smtClean="0"/>
           </a:p>
           <a:p>
             <a:pPr marL="0" indent="0" algn="just">
@@ -4050,6 +4300,96 @@
           </a:p>
         </p:txBody>
       </p:sp>
+      <p:pic>
+        <p:nvPicPr>
+          <p:cNvPr id="2" name="Picture 1" descr="Gotta go fast.png"/>
+          <p:cNvPicPr>
+            <a:picLocks noChangeAspect="1"/>
+          </p:cNvPicPr>
+          <p:nvPr/>
+        </p:nvPicPr>
+        <p:blipFill>
+          <a:blip r:embed="rId3">
+            <a:extLst>
+              <a:ext uri="{28A0092B-C50C-407E-A947-70E740481C1C}">
+                <a14:useLocalDpi xmlns:a14="http://schemas.microsoft.com/office/drawing/2010/main" val="0"/>
+              </a:ext>
+            </a:extLst>
+          </a:blip>
+          <a:stretch>
+            <a:fillRect/>
+          </a:stretch>
+        </p:blipFill>
+        <p:spPr>
+          <a:xfrm>
+            <a:off x="395536" y="4581128"/>
+            <a:ext cx="3785614" cy="2129408"/>
+          </a:xfrm>
+          <a:prstGeom prst="rect">
+            <a:avLst/>
+          </a:prstGeom>
+        </p:spPr>
+      </p:pic>
+      <p:pic>
+        <p:nvPicPr>
+          <p:cNvPr id="3" name="Picture 2" descr="Mr. Strech.png"/>
+          <p:cNvPicPr>
+            <a:picLocks noChangeAspect="1"/>
+          </p:cNvPicPr>
+          <p:nvPr/>
+        </p:nvPicPr>
+        <p:blipFill>
+          <a:blip r:embed="rId4">
+            <a:extLst>
+              <a:ext uri="{28A0092B-C50C-407E-A947-70E740481C1C}">
+                <a14:useLocalDpi xmlns:a14="http://schemas.microsoft.com/office/drawing/2010/main" val="0"/>
+              </a:ext>
+            </a:extLst>
+          </a:blip>
+          <a:stretch>
+            <a:fillRect/>
+          </a:stretch>
+        </p:blipFill>
+        <p:spPr>
+          <a:xfrm>
+            <a:off x="3419872" y="4005064"/>
+            <a:ext cx="2953427" cy="2185536"/>
+          </a:xfrm>
+          <a:prstGeom prst="rect">
+            <a:avLst/>
+          </a:prstGeom>
+        </p:spPr>
+      </p:pic>
+      <p:pic>
+        <p:nvPicPr>
+          <p:cNvPr id="4" name="Picture 3" descr="Jeter.png"/>
+          <p:cNvPicPr>
+            <a:picLocks noChangeAspect="1"/>
+          </p:cNvPicPr>
+          <p:nvPr/>
+        </p:nvPicPr>
+        <p:blipFill>
+          <a:blip r:embed="rId5">
+            <a:extLst>
+              <a:ext uri="{28A0092B-C50C-407E-A947-70E740481C1C}">
+                <a14:useLocalDpi xmlns:a14="http://schemas.microsoft.com/office/drawing/2010/main" val="0"/>
+              </a:ext>
+            </a:extLst>
+          </a:blip>
+          <a:stretch>
+            <a:fillRect/>
+          </a:stretch>
+        </p:blipFill>
+        <p:spPr>
+          <a:xfrm>
+            <a:off x="6012160" y="4424103"/>
+            <a:ext cx="2880320" cy="2173249"/>
+          </a:xfrm>
+          <a:prstGeom prst="rect">
+            <a:avLst/>
+          </a:prstGeom>
+        </p:spPr>
+      </p:pic>
     </p:spTree>
     <p:extLst>
       <p:ext uri="{BB962C8B-B14F-4D97-AF65-F5344CB8AC3E}">
@@ -4129,11 +4469,6 @@
               </a:rPr>
               <a:t>Conclusion</a:t>
             </a:r>
-            <a:endParaRPr lang="fr-CA" dirty="0" smtClean="0">
-              <a:solidFill>
-                <a:schemeClr val="bg1"/>
-              </a:solidFill>
-            </a:endParaRPr>
           </a:p>
         </p:txBody>
       </p:sp>
@@ -4159,25 +4494,79 @@
           </a:bodyPr>
           <a:lstStyle/>
           <a:p>
-            <a:pPr marL="0" indent="0" fontAlgn="auto">
+            <a:pPr fontAlgn="auto">
               <a:spcAft>
                 <a:spcPts val="0"/>
               </a:spcAft>
-              <a:buNone/>
               <a:defRPr/>
             </a:pPr>
             <a:r>
               <a:rPr lang="en-US" sz="2000" dirty="0"/>
-              <a:t>In conclusion, as a sport baseball is a great game. </a:t>
-            </a:r>
-            <a:r>
-              <a:rPr lang="en-US" sz="2000" i="1" dirty="0"/>
-              <a:t>Although baseball is a great game, to really enjoy it and to be good at it takes a lot of practice.</a:t>
+              <a:t>Baseball is a </a:t>
+            </a:r>
+            <a:r>
+              <a:rPr lang="en-US" sz="2000" dirty="0" smtClean="0"/>
+              <a:t>wonderful and </a:t>
             </a:r>
             <a:r>
               <a:rPr lang="en-US" sz="2000" dirty="0"/>
-              <a:t> The game of baseball is entertaining. No matter what age you are baseball is awesome. When you play baseball it is great exercise for your mind and body. Baseball is a wonderfully great sport.	</a:t>
-            </a:r>
+              <a:t>great sport</a:t>
+            </a:r>
+            <a:r>
+              <a:rPr lang="en-US" sz="2000" dirty="0" smtClean="0"/>
+              <a:t>.</a:t>
+            </a:r>
+          </a:p>
+          <a:p>
+            <a:pPr fontAlgn="auto">
+              <a:spcAft>
+                <a:spcPts val="0"/>
+              </a:spcAft>
+              <a:defRPr/>
+            </a:pPr>
+            <a:r>
+              <a:rPr lang="en-US" sz="2000" dirty="0" smtClean="0"/>
+              <a:t>The </a:t>
+            </a:r>
+            <a:r>
+              <a:rPr lang="en-US" sz="2000" dirty="0"/>
+              <a:t>game of baseball is entertaining. </a:t>
+            </a:r>
+            <a:endParaRPr lang="en-US" sz="2000" dirty="0" smtClean="0"/>
+          </a:p>
+          <a:p>
+            <a:pPr fontAlgn="auto">
+              <a:spcAft>
+                <a:spcPts val="0"/>
+              </a:spcAft>
+              <a:defRPr/>
+            </a:pPr>
+            <a:r>
+              <a:rPr lang="en-US" sz="2000" dirty="0" smtClean="0"/>
+              <a:t>No </a:t>
+            </a:r>
+            <a:r>
+              <a:rPr lang="en-US" sz="2000" dirty="0"/>
+              <a:t>matter what age you are baseball is awesome. </a:t>
+            </a:r>
+            <a:endParaRPr lang="en-US" sz="2000" dirty="0" smtClean="0"/>
+          </a:p>
+          <a:p>
+            <a:pPr fontAlgn="auto">
+              <a:spcAft>
+                <a:spcPts val="0"/>
+              </a:spcAft>
+              <a:defRPr/>
+            </a:pPr>
+            <a:r>
+              <a:rPr lang="en-US" sz="2000" dirty="0" smtClean="0"/>
+              <a:t>When </a:t>
+            </a:r>
+            <a:r>
+              <a:rPr lang="en-US" sz="2000" dirty="0"/>
+              <a:t>you play baseball it is great exercise for your mind and body. </a:t>
+            </a:r>
+            <a:endParaRPr lang="en-US" sz="2000" dirty="0" smtClean="0"/>
           </a:p>
           <a:p>
             <a:pPr marL="0" indent="0" algn="just" fontAlgn="auto">
@@ -4188,13 +4577,43 @@
               <a:defRPr/>
             </a:pPr>
             <a:r>
-              <a:rPr lang="fr-CA" sz="2000" smtClean="0"/>
+              <a:rPr lang="fr-CA" sz="2000" dirty="0" smtClean="0"/>
               <a:t> </a:t>
             </a:r>
             <a:endParaRPr lang="fr-CA" sz="2000" dirty="0" smtClean="0"/>
           </a:p>
         </p:txBody>
       </p:sp>
+      <p:pic>
+        <p:nvPicPr>
+          <p:cNvPr id="2" name="Picture 1" descr="Basbeall Field Amazing.png"/>
+          <p:cNvPicPr>
+            <a:picLocks noChangeAspect="1"/>
+          </p:cNvPicPr>
+          <p:nvPr/>
+        </p:nvPicPr>
+        <p:blipFill>
+          <a:blip r:embed="rId3">
+            <a:extLst>
+              <a:ext uri="{28A0092B-C50C-407E-A947-70E740481C1C}">
+                <a14:useLocalDpi xmlns:a14="http://schemas.microsoft.com/office/drawing/2010/main" val="0"/>
+              </a:ext>
+            </a:extLst>
+          </a:blip>
+          <a:stretch>
+            <a:fillRect/>
+          </a:stretch>
+        </p:blipFill>
+        <p:spPr>
+          <a:xfrm>
+            <a:off x="683568" y="3573016"/>
+            <a:ext cx="7992888" cy="3118430"/>
+          </a:xfrm>
+          <a:prstGeom prst="rect">
+            <a:avLst/>
+          </a:prstGeom>
+        </p:spPr>
+      </p:pic>
     </p:spTree>
   </p:cSld>
   <p:clrMapOvr>

</xml_diff>